<commit_message>
Edited ppt little bit.
</commit_message>
<xml_diff>
--- a/BigDataPpt.pptx
+++ b/BigDataPpt.pptx
@@ -118,6 +118,22 @@
       </a:defRPr>
     </a:lvl9pPr>
   </p:defaultTextStyle>
+  <p:extLst>
+    <p:ext uri="{EFAFB233-063F-42B5-8137-9DF3F51BA10A}">
+      <p15:sldGuideLst xmlns:p15="http://schemas.microsoft.com/office/powerpoint/2012/main">
+        <p15:guide id="1" orient="horz" pos="2160">
+          <p15:clr>
+            <a:srgbClr val="A4A3A4"/>
+          </p15:clr>
+        </p15:guide>
+        <p15:guide id="2" pos="2880">
+          <p15:clr>
+            <a:srgbClr val="A4A3A4"/>
+          </p15:clr>
+        </p15:guide>
+      </p15:sldGuideLst>
+    </p:ext>
+  </p:extLst>
 </p:presentation>
 </file>
 
@@ -204,7 +220,7 @@
             <a:fld id="{1648733B-82BF-4571-9197-8DE2882EBF2B}" type="datetimeFigureOut">
               <a:rPr lang="en-US" smtClean="0"/>
               <a:pPr/>
-              <a:t>2/16/2020</a:t>
+              <a:t>24-Feb-20</a:t>
             </a:fld>
             <a:endParaRPr lang="en-US"/>
           </a:p>
@@ -270,38 +286,37 @@
           <a:p>
             <a:pPr lvl="0"/>
             <a:r>
-              <a:rPr lang="en-US" smtClean="0"/>
+              <a:rPr lang="en-US"/>
               <a:t>Click to edit Master text styles</a:t>
             </a:r>
           </a:p>
           <a:p>
             <a:pPr lvl="1"/>
             <a:r>
-              <a:rPr lang="en-US" smtClean="0"/>
+              <a:rPr lang="en-US"/>
               <a:t>Second level</a:t>
             </a:r>
           </a:p>
           <a:p>
             <a:pPr lvl="2"/>
             <a:r>
-              <a:rPr lang="en-US" smtClean="0"/>
+              <a:rPr lang="en-US"/>
               <a:t>Third level</a:t>
             </a:r>
           </a:p>
           <a:p>
             <a:pPr lvl="3"/>
             <a:r>
-              <a:rPr lang="en-US" smtClean="0"/>
+              <a:rPr lang="en-US"/>
               <a:t>Fourth level</a:t>
             </a:r>
           </a:p>
           <a:p>
             <a:pPr lvl="4"/>
             <a:r>
-              <a:rPr lang="en-US" smtClean="0"/>
+              <a:rPr lang="en-US"/>
               <a:t>Fifth level</a:t>
             </a:r>
-            <a:endParaRPr lang="en-US"/>
           </a:p>
         </p:txBody>
       </p:sp>
@@ -508,10 +523,9 @@
           <a:lstStyle/>
           <a:p>
             <a:r>
-              <a:rPr lang="en-US" smtClean="0"/>
+              <a:rPr lang="en-US"/>
               <a:t>Click to edit Master title style</a:t>
             </a:r>
-            <a:endParaRPr lang="en-US"/>
           </a:p>
         </p:txBody>
       </p:sp>
@@ -627,10 +641,9 @@
           </a:lstStyle>
           <a:p>
             <a:r>
-              <a:rPr lang="en-US" smtClean="0"/>
+              <a:rPr lang="en-US"/>
               <a:t>Click to edit Master subtitle style</a:t>
             </a:r>
-            <a:endParaRPr lang="en-US"/>
           </a:p>
         </p:txBody>
       </p:sp>
@@ -652,7 +665,7 @@
             <a:fld id="{1D8BD707-D9CF-40AE-B4C6-C98DA3205C09}" type="datetimeFigureOut">
               <a:rPr lang="en-US" smtClean="0"/>
               <a:pPr/>
-              <a:t>2/16/2020</a:t>
+              <a:t>24-Feb-20</a:t>
             </a:fld>
             <a:endParaRPr lang="en-US"/>
           </a:p>
@@ -742,10 +755,9 @@
           <a:lstStyle/>
           <a:p>
             <a:r>
-              <a:rPr lang="en-US" smtClean="0"/>
+              <a:rPr lang="en-US"/>
               <a:t>Click to edit Master title style</a:t>
             </a:r>
-            <a:endParaRPr lang="en-US"/>
           </a:p>
         </p:txBody>
       </p:sp>
@@ -766,38 +778,37 @@
           <a:p>
             <a:pPr lvl="0"/>
             <a:r>
-              <a:rPr lang="en-US" smtClean="0"/>
+              <a:rPr lang="en-US"/>
               <a:t>Click to edit Master text styles</a:t>
             </a:r>
           </a:p>
           <a:p>
             <a:pPr lvl="1"/>
             <a:r>
-              <a:rPr lang="en-US" smtClean="0"/>
+              <a:rPr lang="en-US"/>
               <a:t>Second level</a:t>
             </a:r>
           </a:p>
           <a:p>
             <a:pPr lvl="2"/>
             <a:r>
-              <a:rPr lang="en-US" smtClean="0"/>
+              <a:rPr lang="en-US"/>
               <a:t>Third level</a:t>
             </a:r>
           </a:p>
           <a:p>
             <a:pPr lvl="3"/>
             <a:r>
-              <a:rPr lang="en-US" smtClean="0"/>
+              <a:rPr lang="en-US"/>
               <a:t>Fourth level</a:t>
             </a:r>
           </a:p>
           <a:p>
             <a:pPr lvl="4"/>
             <a:r>
-              <a:rPr lang="en-US" smtClean="0"/>
+              <a:rPr lang="en-US"/>
               <a:t>Fifth level</a:t>
             </a:r>
-            <a:endParaRPr lang="en-US"/>
           </a:p>
         </p:txBody>
       </p:sp>
@@ -819,7 +830,7 @@
             <a:fld id="{1D8BD707-D9CF-40AE-B4C6-C98DA3205C09}" type="datetimeFigureOut">
               <a:rPr lang="en-US" smtClean="0"/>
               <a:pPr/>
-              <a:t>2/16/2020</a:t>
+              <a:t>24-Feb-20</a:t>
             </a:fld>
             <a:endParaRPr lang="en-US"/>
           </a:p>
@@ -914,10 +925,9 @@
           <a:lstStyle/>
           <a:p>
             <a:r>
-              <a:rPr lang="en-US" smtClean="0"/>
+              <a:rPr lang="en-US"/>
               <a:t>Click to edit Master title style</a:t>
             </a:r>
-            <a:endParaRPr lang="en-US"/>
           </a:p>
         </p:txBody>
       </p:sp>
@@ -943,38 +953,37 @@
           <a:p>
             <a:pPr lvl="0"/>
             <a:r>
-              <a:rPr lang="en-US" smtClean="0"/>
+              <a:rPr lang="en-US"/>
               <a:t>Click to edit Master text styles</a:t>
             </a:r>
           </a:p>
           <a:p>
             <a:pPr lvl="1"/>
             <a:r>
-              <a:rPr lang="en-US" smtClean="0"/>
+              <a:rPr lang="en-US"/>
               <a:t>Second level</a:t>
             </a:r>
           </a:p>
           <a:p>
             <a:pPr lvl="2"/>
             <a:r>
-              <a:rPr lang="en-US" smtClean="0"/>
+              <a:rPr lang="en-US"/>
               <a:t>Third level</a:t>
             </a:r>
           </a:p>
           <a:p>
             <a:pPr lvl="3"/>
             <a:r>
-              <a:rPr lang="en-US" smtClean="0"/>
+              <a:rPr lang="en-US"/>
               <a:t>Fourth level</a:t>
             </a:r>
           </a:p>
           <a:p>
             <a:pPr lvl="4"/>
             <a:r>
-              <a:rPr lang="en-US" smtClean="0"/>
+              <a:rPr lang="en-US"/>
               <a:t>Fifth level</a:t>
             </a:r>
-            <a:endParaRPr lang="en-US"/>
           </a:p>
         </p:txBody>
       </p:sp>
@@ -996,7 +1005,7 @@
             <a:fld id="{1D8BD707-D9CF-40AE-B4C6-C98DA3205C09}" type="datetimeFigureOut">
               <a:rPr lang="en-US" smtClean="0"/>
               <a:pPr/>
-              <a:t>2/16/2020</a:t>
+              <a:t>24-Feb-20</a:t>
             </a:fld>
             <a:endParaRPr lang="en-US"/>
           </a:p>
@@ -1086,10 +1095,9 @@
           <a:lstStyle/>
           <a:p>
             <a:r>
-              <a:rPr lang="en-US" smtClean="0"/>
+              <a:rPr lang="en-US"/>
               <a:t>Click to edit Master title style</a:t>
             </a:r>
-            <a:endParaRPr lang="en-US"/>
           </a:p>
         </p:txBody>
       </p:sp>
@@ -1110,38 +1118,37 @@
           <a:p>
             <a:pPr lvl="0"/>
             <a:r>
-              <a:rPr lang="en-US" smtClean="0"/>
+              <a:rPr lang="en-US"/>
               <a:t>Click to edit Master text styles</a:t>
             </a:r>
           </a:p>
           <a:p>
             <a:pPr lvl="1"/>
             <a:r>
-              <a:rPr lang="en-US" smtClean="0"/>
+              <a:rPr lang="en-US"/>
               <a:t>Second level</a:t>
             </a:r>
           </a:p>
           <a:p>
             <a:pPr lvl="2"/>
             <a:r>
-              <a:rPr lang="en-US" smtClean="0"/>
+              <a:rPr lang="en-US"/>
               <a:t>Third level</a:t>
             </a:r>
           </a:p>
           <a:p>
             <a:pPr lvl="3"/>
             <a:r>
-              <a:rPr lang="en-US" smtClean="0"/>
+              <a:rPr lang="en-US"/>
               <a:t>Fourth level</a:t>
             </a:r>
           </a:p>
           <a:p>
             <a:pPr lvl="4"/>
             <a:r>
-              <a:rPr lang="en-US" smtClean="0"/>
+              <a:rPr lang="en-US"/>
               <a:t>Fifth level</a:t>
             </a:r>
-            <a:endParaRPr lang="en-US"/>
           </a:p>
         </p:txBody>
       </p:sp>
@@ -1163,7 +1170,7 @@
             <a:fld id="{1D8BD707-D9CF-40AE-B4C6-C98DA3205C09}" type="datetimeFigureOut">
               <a:rPr lang="en-US" smtClean="0"/>
               <a:pPr/>
-              <a:t>2/16/2020</a:t>
+              <a:t>24-Feb-20</a:t>
             </a:fld>
             <a:endParaRPr lang="en-US"/>
           </a:p>
@@ -1262,10 +1269,9 @@
           </a:lstStyle>
           <a:p>
             <a:r>
-              <a:rPr lang="en-US" smtClean="0"/>
+              <a:rPr lang="en-US"/>
               <a:t>Click to edit Master title style</a:t>
             </a:r>
-            <a:endParaRPr lang="en-US"/>
           </a:p>
         </p:txBody>
       </p:sp>
@@ -1382,7 +1388,7 @@
           <a:p>
             <a:pPr lvl="0"/>
             <a:r>
-              <a:rPr lang="en-US" smtClean="0"/>
+              <a:rPr lang="en-US"/>
               <a:t>Click to edit Master text styles</a:t>
             </a:r>
           </a:p>
@@ -1406,7 +1412,7 @@
             <a:fld id="{1D8BD707-D9CF-40AE-B4C6-C98DA3205C09}" type="datetimeFigureOut">
               <a:rPr lang="en-US" smtClean="0"/>
               <a:pPr/>
-              <a:t>2/16/2020</a:t>
+              <a:t>24-Feb-20</a:t>
             </a:fld>
             <a:endParaRPr lang="en-US"/>
           </a:p>
@@ -1496,10 +1502,9 @@
           <a:lstStyle/>
           <a:p>
             <a:r>
-              <a:rPr lang="en-US" smtClean="0"/>
+              <a:rPr lang="en-US"/>
               <a:t>Click to edit Master title style</a:t>
             </a:r>
-            <a:endParaRPr lang="en-US"/>
           </a:p>
         </p:txBody>
       </p:sp>
@@ -1553,38 +1558,37 @@
           <a:p>
             <a:pPr lvl="0"/>
             <a:r>
-              <a:rPr lang="en-US" smtClean="0"/>
+              <a:rPr lang="en-US"/>
               <a:t>Click to edit Master text styles</a:t>
             </a:r>
           </a:p>
           <a:p>
             <a:pPr lvl="1"/>
             <a:r>
-              <a:rPr lang="en-US" smtClean="0"/>
+              <a:rPr lang="en-US"/>
               <a:t>Second level</a:t>
             </a:r>
           </a:p>
           <a:p>
             <a:pPr lvl="2"/>
             <a:r>
-              <a:rPr lang="en-US" smtClean="0"/>
+              <a:rPr lang="en-US"/>
               <a:t>Third level</a:t>
             </a:r>
           </a:p>
           <a:p>
             <a:pPr lvl="3"/>
             <a:r>
-              <a:rPr lang="en-US" smtClean="0"/>
+              <a:rPr lang="en-US"/>
               <a:t>Fourth level</a:t>
             </a:r>
           </a:p>
           <a:p>
             <a:pPr lvl="4"/>
             <a:r>
-              <a:rPr lang="en-US" smtClean="0"/>
+              <a:rPr lang="en-US"/>
               <a:t>Fifth level</a:t>
             </a:r>
-            <a:endParaRPr lang="en-US"/>
           </a:p>
         </p:txBody>
       </p:sp>
@@ -1638,38 +1642,37 @@
           <a:p>
             <a:pPr lvl="0"/>
             <a:r>
-              <a:rPr lang="en-US" smtClean="0"/>
+              <a:rPr lang="en-US"/>
               <a:t>Click to edit Master text styles</a:t>
             </a:r>
           </a:p>
           <a:p>
             <a:pPr lvl="1"/>
             <a:r>
-              <a:rPr lang="en-US" smtClean="0"/>
+              <a:rPr lang="en-US"/>
               <a:t>Second level</a:t>
             </a:r>
           </a:p>
           <a:p>
             <a:pPr lvl="2"/>
             <a:r>
-              <a:rPr lang="en-US" smtClean="0"/>
+              <a:rPr lang="en-US"/>
               <a:t>Third level</a:t>
             </a:r>
           </a:p>
           <a:p>
             <a:pPr lvl="3"/>
             <a:r>
-              <a:rPr lang="en-US" smtClean="0"/>
+              <a:rPr lang="en-US"/>
               <a:t>Fourth level</a:t>
             </a:r>
           </a:p>
           <a:p>
             <a:pPr lvl="4"/>
             <a:r>
-              <a:rPr lang="en-US" smtClean="0"/>
+              <a:rPr lang="en-US"/>
               <a:t>Fifth level</a:t>
             </a:r>
-            <a:endParaRPr lang="en-US"/>
           </a:p>
         </p:txBody>
       </p:sp>
@@ -1691,7 +1694,7 @@
             <a:fld id="{1D8BD707-D9CF-40AE-B4C6-C98DA3205C09}" type="datetimeFigureOut">
               <a:rPr lang="en-US" smtClean="0"/>
               <a:pPr/>
-              <a:t>2/16/2020</a:t>
+              <a:t>24-Feb-20</a:t>
             </a:fld>
             <a:endParaRPr lang="en-US"/>
           </a:p>
@@ -1785,10 +1788,9 @@
           </a:lstStyle>
           <a:p>
             <a:r>
-              <a:rPr lang="en-US" smtClean="0"/>
+              <a:rPr lang="en-US"/>
               <a:t>Click to edit Master title style</a:t>
             </a:r>
-            <a:endParaRPr lang="en-US"/>
           </a:p>
         </p:txBody>
       </p:sp>
@@ -1851,7 +1853,7 @@
           <a:p>
             <a:pPr lvl="0"/>
             <a:r>
-              <a:rPr lang="en-US" smtClean="0"/>
+              <a:rPr lang="en-US"/>
               <a:t>Click to edit Master text styles</a:t>
             </a:r>
           </a:p>
@@ -1907,38 +1909,37 @@
           <a:p>
             <a:pPr lvl="0"/>
             <a:r>
-              <a:rPr lang="en-US" smtClean="0"/>
+              <a:rPr lang="en-US"/>
               <a:t>Click to edit Master text styles</a:t>
             </a:r>
           </a:p>
           <a:p>
             <a:pPr lvl="1"/>
             <a:r>
-              <a:rPr lang="en-US" smtClean="0"/>
+              <a:rPr lang="en-US"/>
               <a:t>Second level</a:t>
             </a:r>
           </a:p>
           <a:p>
             <a:pPr lvl="2"/>
             <a:r>
-              <a:rPr lang="en-US" smtClean="0"/>
+              <a:rPr lang="en-US"/>
               <a:t>Third level</a:t>
             </a:r>
           </a:p>
           <a:p>
             <a:pPr lvl="3"/>
             <a:r>
-              <a:rPr lang="en-US" smtClean="0"/>
+              <a:rPr lang="en-US"/>
               <a:t>Fourth level</a:t>
             </a:r>
           </a:p>
           <a:p>
             <a:pPr lvl="4"/>
             <a:r>
-              <a:rPr lang="en-US" smtClean="0"/>
+              <a:rPr lang="en-US"/>
               <a:t>Fifth level</a:t>
             </a:r>
-            <a:endParaRPr lang="en-US"/>
           </a:p>
         </p:txBody>
       </p:sp>
@@ -2001,7 +2002,7 @@
           <a:p>
             <a:pPr lvl="0"/>
             <a:r>
-              <a:rPr lang="en-US" smtClean="0"/>
+              <a:rPr lang="en-US"/>
               <a:t>Click to edit Master text styles</a:t>
             </a:r>
           </a:p>
@@ -2057,38 +2058,37 @@
           <a:p>
             <a:pPr lvl="0"/>
             <a:r>
-              <a:rPr lang="en-US" smtClean="0"/>
+              <a:rPr lang="en-US"/>
               <a:t>Click to edit Master text styles</a:t>
             </a:r>
           </a:p>
           <a:p>
             <a:pPr lvl="1"/>
             <a:r>
-              <a:rPr lang="en-US" smtClean="0"/>
+              <a:rPr lang="en-US"/>
               <a:t>Second level</a:t>
             </a:r>
           </a:p>
           <a:p>
             <a:pPr lvl="2"/>
             <a:r>
-              <a:rPr lang="en-US" smtClean="0"/>
+              <a:rPr lang="en-US"/>
               <a:t>Third level</a:t>
             </a:r>
           </a:p>
           <a:p>
             <a:pPr lvl="3"/>
             <a:r>
-              <a:rPr lang="en-US" smtClean="0"/>
+              <a:rPr lang="en-US"/>
               <a:t>Fourth level</a:t>
             </a:r>
           </a:p>
           <a:p>
             <a:pPr lvl="4"/>
             <a:r>
-              <a:rPr lang="en-US" smtClean="0"/>
+              <a:rPr lang="en-US"/>
               <a:t>Fifth level</a:t>
             </a:r>
-            <a:endParaRPr lang="en-US"/>
           </a:p>
         </p:txBody>
       </p:sp>
@@ -2110,7 +2110,7 @@
             <a:fld id="{1D8BD707-D9CF-40AE-B4C6-C98DA3205C09}" type="datetimeFigureOut">
               <a:rPr lang="en-US" smtClean="0"/>
               <a:pPr/>
-              <a:t>2/16/2020</a:t>
+              <a:t>24-Feb-20</a:t>
             </a:fld>
             <a:endParaRPr lang="en-US"/>
           </a:p>
@@ -2200,10 +2200,9 @@
           <a:lstStyle/>
           <a:p>
             <a:r>
-              <a:rPr lang="en-US" smtClean="0"/>
+              <a:rPr lang="en-US"/>
               <a:t>Click to edit Master title style</a:t>
             </a:r>
-            <a:endParaRPr lang="en-US"/>
           </a:p>
         </p:txBody>
       </p:sp>
@@ -2225,7 +2224,7 @@
             <a:fld id="{1D8BD707-D9CF-40AE-B4C6-C98DA3205C09}" type="datetimeFigureOut">
               <a:rPr lang="en-US" smtClean="0"/>
               <a:pPr/>
-              <a:t>2/16/2020</a:t>
+              <a:t>24-Feb-20</a:t>
             </a:fld>
             <a:endParaRPr lang="en-US"/>
           </a:p>
@@ -2317,7 +2316,7 @@
             <a:fld id="{1D8BD707-D9CF-40AE-B4C6-C98DA3205C09}" type="datetimeFigureOut">
               <a:rPr lang="en-US" smtClean="0"/>
               <a:pPr/>
-              <a:t>2/16/2020</a:t>
+              <a:t>24-Feb-20</a:t>
             </a:fld>
             <a:endParaRPr lang="en-US"/>
           </a:p>
@@ -2416,10 +2415,9 @@
           </a:lstStyle>
           <a:p>
             <a:r>
-              <a:rPr lang="en-US" smtClean="0"/>
+              <a:rPr lang="en-US"/>
               <a:t>Click to edit Master title style</a:t>
             </a:r>
-            <a:endParaRPr lang="en-US"/>
           </a:p>
         </p:txBody>
       </p:sp>
@@ -2473,38 +2471,37 @@
           <a:p>
             <a:pPr lvl="0"/>
             <a:r>
-              <a:rPr lang="en-US" smtClean="0"/>
+              <a:rPr lang="en-US"/>
               <a:t>Click to edit Master text styles</a:t>
             </a:r>
           </a:p>
           <a:p>
             <a:pPr lvl="1"/>
             <a:r>
-              <a:rPr lang="en-US" smtClean="0"/>
+              <a:rPr lang="en-US"/>
               <a:t>Second level</a:t>
             </a:r>
           </a:p>
           <a:p>
             <a:pPr lvl="2"/>
             <a:r>
-              <a:rPr lang="en-US" smtClean="0"/>
+              <a:rPr lang="en-US"/>
               <a:t>Third level</a:t>
             </a:r>
           </a:p>
           <a:p>
             <a:pPr lvl="3"/>
             <a:r>
-              <a:rPr lang="en-US" smtClean="0"/>
+              <a:rPr lang="en-US"/>
               <a:t>Fourth level</a:t>
             </a:r>
           </a:p>
           <a:p>
             <a:pPr lvl="4"/>
             <a:r>
-              <a:rPr lang="en-US" smtClean="0"/>
+              <a:rPr lang="en-US"/>
               <a:t>Fifth level</a:t>
             </a:r>
-            <a:endParaRPr lang="en-US"/>
           </a:p>
         </p:txBody>
       </p:sp>
@@ -2567,7 +2564,7 @@
           <a:p>
             <a:pPr lvl="0"/>
             <a:r>
-              <a:rPr lang="en-US" smtClean="0"/>
+              <a:rPr lang="en-US"/>
               <a:t>Click to edit Master text styles</a:t>
             </a:r>
           </a:p>
@@ -2591,7 +2588,7 @@
             <a:fld id="{1D8BD707-D9CF-40AE-B4C6-C98DA3205C09}" type="datetimeFigureOut">
               <a:rPr lang="en-US" smtClean="0"/>
               <a:pPr/>
-              <a:t>2/16/2020</a:t>
+              <a:t>24-Feb-20</a:t>
             </a:fld>
             <a:endParaRPr lang="en-US"/>
           </a:p>
@@ -2690,10 +2687,9 @@
           </a:lstStyle>
           <a:p>
             <a:r>
-              <a:rPr lang="en-US" smtClean="0"/>
+              <a:rPr lang="en-US"/>
               <a:t>Click to edit Master title style</a:t>
             </a:r>
-            <a:endParaRPr lang="en-US"/>
           </a:p>
         </p:txBody>
       </p:sp>
@@ -2817,7 +2813,7 @@
           <a:p>
             <a:pPr lvl="0"/>
             <a:r>
-              <a:rPr lang="en-US" smtClean="0"/>
+              <a:rPr lang="en-US"/>
               <a:t>Click to edit Master text styles</a:t>
             </a:r>
           </a:p>
@@ -2841,7 +2837,7 @@
             <a:fld id="{1D8BD707-D9CF-40AE-B4C6-C98DA3205C09}" type="datetimeFigureOut">
               <a:rPr lang="en-US" smtClean="0"/>
               <a:pPr/>
-              <a:t>2/16/2020</a:t>
+              <a:t>24-Feb-20</a:t>
             </a:fld>
             <a:endParaRPr lang="en-US"/>
           </a:p>
@@ -2946,10 +2942,9 @@
           <a:lstStyle/>
           <a:p>
             <a:r>
-              <a:rPr lang="en-US" smtClean="0"/>
+              <a:rPr lang="en-US"/>
               <a:t>Click to edit Master title style</a:t>
             </a:r>
-            <a:endParaRPr lang="en-US"/>
           </a:p>
         </p:txBody>
       </p:sp>
@@ -2980,38 +2975,37 @@
           <a:p>
             <a:pPr lvl="0"/>
             <a:r>
-              <a:rPr lang="en-US" smtClean="0"/>
+              <a:rPr lang="en-US"/>
               <a:t>Click to edit Master text styles</a:t>
             </a:r>
           </a:p>
           <a:p>
             <a:pPr lvl="1"/>
             <a:r>
-              <a:rPr lang="en-US" smtClean="0"/>
+              <a:rPr lang="en-US"/>
               <a:t>Second level</a:t>
             </a:r>
           </a:p>
           <a:p>
             <a:pPr lvl="2"/>
             <a:r>
-              <a:rPr lang="en-US" smtClean="0"/>
+              <a:rPr lang="en-US"/>
               <a:t>Third level</a:t>
             </a:r>
           </a:p>
           <a:p>
             <a:pPr lvl="3"/>
             <a:r>
-              <a:rPr lang="en-US" smtClean="0"/>
+              <a:rPr lang="en-US"/>
               <a:t>Fourth level</a:t>
             </a:r>
           </a:p>
           <a:p>
             <a:pPr lvl="4"/>
             <a:r>
-              <a:rPr lang="en-US" smtClean="0"/>
+              <a:rPr lang="en-US"/>
               <a:t>Fifth level</a:t>
             </a:r>
-            <a:endParaRPr lang="en-US"/>
           </a:p>
         </p:txBody>
       </p:sp>
@@ -3051,7 +3045,7 @@
             <a:fld id="{1D8BD707-D9CF-40AE-B4C6-C98DA3205C09}" type="datetimeFigureOut">
               <a:rPr lang="en-US" smtClean="0"/>
               <a:pPr/>
-              <a:t>2/16/2020</a:t>
+              <a:t>24-Feb-20</a:t>
             </a:fld>
             <a:endParaRPr lang="en-US"/>
           </a:p>
@@ -3440,16 +3434,12 @@
           <a:lstStyle/>
           <a:p>
             <a:r>
-              <a:rPr lang="en-US" sz="4000" dirty="0" smtClean="0">
+              <a:rPr lang="en-US" sz="4000" dirty="0">
                 <a:latin typeface="Times New Roman" pitchFamily="18" charset="0"/>
                 <a:cs typeface="Times New Roman" pitchFamily="18" charset="0"/>
               </a:rPr>
               <a:t>Indian Crop Data Analysis To Grow Suitable Crops</a:t>
             </a:r>
-            <a:endParaRPr lang="en-US" sz="4000" dirty="0">
-              <a:latin typeface="Times New Roman" pitchFamily="18" charset="0"/>
-              <a:cs typeface="Times New Roman" pitchFamily="18" charset="0"/>
-            </a:endParaRPr>
           </a:p>
         </p:txBody>
       </p:sp>
@@ -3477,7 +3467,7 @@
           <a:p>
             <a:pPr algn="l"/>
             <a:r>
-              <a:rPr lang="en-US" dirty="0" smtClean="0">
+              <a:rPr lang="en-US" dirty="0">
                 <a:solidFill>
                   <a:schemeClr val="tx1"/>
                 </a:solidFill>
@@ -3488,7 +3478,7 @@
           <a:p>
             <a:pPr algn="l"/>
             <a:r>
-              <a:rPr lang="en-US" sz="2400" dirty="0" smtClean="0">
+              <a:rPr lang="en-US" sz="2400" dirty="0">
                 <a:solidFill>
                   <a:schemeClr val="tx1"/>
                 </a:solidFill>
@@ -3499,7 +3489,7 @@
           <a:p>
             <a:pPr algn="l"/>
             <a:r>
-              <a:rPr lang="en-US" sz="2400" dirty="0" smtClean="0">
+              <a:rPr lang="en-US" sz="2400" dirty="0">
                 <a:solidFill>
                   <a:schemeClr val="tx1"/>
                 </a:solidFill>
@@ -3507,7 +3497,7 @@
               <a:t>           </a:t>
             </a:r>
             <a:r>
-              <a:rPr lang="en-US" sz="2400" dirty="0" err="1" smtClean="0">
+              <a:rPr lang="en-US" sz="2400" dirty="0" err="1">
                 <a:solidFill>
                   <a:schemeClr val="tx1"/>
                 </a:solidFill>
@@ -3515,7 +3505,7 @@
               <a:t>Aman</a:t>
             </a:r>
             <a:r>
-              <a:rPr lang="en-US" sz="2400" dirty="0" smtClean="0">
+              <a:rPr lang="en-US" sz="2400" dirty="0">
                 <a:solidFill>
                   <a:schemeClr val="tx1"/>
                 </a:solidFill>
@@ -3526,7 +3516,7 @@
           <a:p>
             <a:pPr algn="l"/>
             <a:r>
-              <a:rPr lang="en-US" sz="2400" dirty="0" smtClean="0">
+              <a:rPr lang="en-US" sz="2400" dirty="0">
                 <a:solidFill>
                   <a:schemeClr val="tx1"/>
                 </a:solidFill>
@@ -3534,7 +3524,7 @@
               <a:t>           </a:t>
             </a:r>
             <a:r>
-              <a:rPr lang="en-US" sz="2400" dirty="0" err="1" smtClean="0">
+              <a:rPr lang="en-US" sz="2400" dirty="0" err="1">
                 <a:solidFill>
                   <a:schemeClr val="tx1"/>
                 </a:solidFill>
@@ -3542,7 +3532,7 @@
               <a:t>Ashutosh</a:t>
             </a:r>
             <a:r>
-              <a:rPr lang="en-US" sz="2400" dirty="0" smtClean="0">
+              <a:rPr lang="en-US" sz="2400" dirty="0">
                 <a:solidFill>
                   <a:schemeClr val="tx1"/>
                 </a:solidFill>
@@ -3566,7 +3556,7 @@
           <a:blip r:embed="rId2" cstate="print">
             <a:extLst>
               <a:ext uri="{28A0092B-C50C-407E-A947-70E740481C1C}">
-                <a14:useLocalDpi xmlns:a14="http://schemas.microsoft.com/office/drawing/2010/main" xmlns="" val="0"/>
+                <a14:useLocalDpi xmlns:a14="http://schemas.microsoft.com/office/drawing/2010/main" val="0"/>
               </a:ext>
             </a:extLst>
           </a:blip>
@@ -3589,13 +3579,6 @@
   <p:clrMapOvr>
     <a:masterClrMapping/>
   </p:clrMapOvr>
-  <p:timing>
-    <p:tnLst>
-      <p:par>
-        <p:cTn id="1" dur="indefinite" restart="never" nodeType="tmRoot"/>
-      </p:par>
-    </p:tnLst>
-  </p:timing>
 </p:sld>
 </file>
 
@@ -3632,10 +3615,9 @@
           <a:lstStyle/>
           <a:p>
             <a:r>
-              <a:rPr lang="en-US" dirty="0" smtClean="0"/>
+              <a:rPr lang="en-US" dirty="0"/>
               <a:t> </a:t>
             </a:r>
-            <a:endParaRPr lang="en-US" dirty="0"/>
           </a:p>
         </p:txBody>
       </p:sp>
@@ -3678,13 +3660,6 @@
   <p:clrMapOvr>
     <a:masterClrMapping/>
   </p:clrMapOvr>
-  <p:timing>
-    <p:tnLst>
-      <p:par>
-        <p:cTn id="1" dur="indefinite" restart="never" nodeType="tmRoot"/>
-      </p:par>
-    </p:tnLst>
-  </p:timing>
 </p:sld>
 </file>
 
@@ -3721,10 +3696,9 @@
           <a:lstStyle/>
           <a:p>
             <a:r>
-              <a:rPr lang="en-US" dirty="0" smtClean="0"/>
+              <a:rPr lang="en-US" dirty="0"/>
               <a:t>Future Prospective</a:t>
             </a:r>
-            <a:endParaRPr lang="en-US" dirty="0"/>
           </a:p>
         </p:txBody>
       </p:sp>
@@ -3746,33 +3720,33 @@
           <a:lstStyle/>
           <a:p>
             <a:r>
-              <a:rPr lang="en-US" sz="2400" dirty="0" smtClean="0"/>
+              <a:rPr lang="en-US" sz="2400" dirty="0"/>
               <a:t>Currently, we are able to display the top </a:t>
             </a:r>
             <a:r>
-              <a:rPr lang="en-US" sz="2400" dirty="0" err="1" smtClean="0"/>
+              <a:rPr lang="en-US" sz="2400" dirty="0" err="1"/>
               <a:t>top</a:t>
             </a:r>
             <a:r>
-              <a:rPr lang="en-US" sz="2400" dirty="0" smtClean="0"/>
+              <a:rPr lang="en-US" sz="2400" dirty="0"/>
               <a:t> three crops of farmer’s district, by which he will be able to decide which crop he should grow.</a:t>
             </a:r>
           </a:p>
           <a:p>
-            <a:endParaRPr lang="en-US" sz="2400" dirty="0" smtClean="0"/>
-          </a:p>
-          <a:p>
-            <a:r>
-              <a:rPr lang="en-US" sz="2400" dirty="0" smtClean="0"/>
-              <a:t>We are planning to show the daily prices of the market for that crop which he wants to grow  by using the real time data provided by government.</a:t>
-            </a:r>
-          </a:p>
-          <a:p>
-            <a:endParaRPr lang="en-IN" sz="2400" dirty="0" smtClean="0"/>
-          </a:p>
-          <a:p>
-            <a:r>
-              <a:rPr lang="en-IN" sz="2400" dirty="0" smtClean="0"/>
+            <a:endParaRPr lang="en-US" sz="2400" dirty="0"/>
+          </a:p>
+          <a:p>
+            <a:r>
+              <a:rPr lang="en-US" sz="2400" dirty="0"/>
+              <a:t>We are planning to show the  prices of the market for that crop which he wants to grow  by using the real time data provided by government.</a:t>
+            </a:r>
+          </a:p>
+          <a:p>
+            <a:endParaRPr lang="en-IN" sz="2400" dirty="0"/>
+          </a:p>
+          <a:p>
+            <a:r>
+              <a:rPr lang="en-IN" sz="2400" dirty="0"/>
               <a:t>We will also try to show the map of the farmers place so that he can look for the transportation needed and thus can calculate total transportation cost.</a:t>
             </a:r>
             <a:endParaRPr lang="en-US" sz="2400" dirty="0"/>
@@ -3784,13 +3758,6 @@
   <p:clrMapOvr>
     <a:masterClrMapping/>
   </p:clrMapOvr>
-  <p:timing>
-    <p:tnLst>
-      <p:par>
-        <p:cTn id="1" dur="indefinite" restart="never" nodeType="tmRoot"/>
-      </p:par>
-    </p:tnLst>
-  </p:timing>
 </p:sld>
 </file>
 
@@ -3827,10 +3794,9 @@
           <a:lstStyle/>
           <a:p>
             <a:r>
-              <a:rPr lang="en-US" dirty="0" smtClean="0"/>
+              <a:rPr lang="en-US" dirty="0"/>
               <a:t> </a:t>
             </a:r>
-            <a:endParaRPr lang="en-US" dirty="0"/>
           </a:p>
         </p:txBody>
       </p:sp>
@@ -3853,10 +3819,9 @@
               <a:buNone/>
             </a:pPr>
             <a:r>
-              <a:rPr lang="en-US" dirty="0" smtClean="0"/>
+              <a:rPr lang="en-US" dirty="0"/>
               <a:t>  </a:t>
             </a:r>
-            <a:endParaRPr lang="en-US" dirty="0"/>
           </a:p>
         </p:txBody>
       </p:sp>
@@ -3898,7 +3863,7 @@
           <a:p>
             <a:pPr algn="ctr"/>
             <a:r>
-              <a:rPr lang="en-US" sz="9600" b="1" cap="none" spc="0" dirty="0" smtClean="0">
+              <a:rPr lang="en-US" sz="9600" b="1" cap="none" spc="0" dirty="0">
                 <a:ln w="11430"/>
                 <a:gradFill>
                   <a:gsLst>
@@ -3935,7 +3900,7 @@
               </a:rPr>
               <a:t>Thank You </a:t>
             </a:r>
-            <a:endParaRPr lang="en-US" sz="9600" b="1" dirty="0" smtClean="0">
+            <a:endParaRPr lang="en-US" sz="9600" b="1" dirty="0">
               <a:ln w="11430"/>
               <a:gradFill>
                 <a:gsLst>
@@ -3979,13 +3944,6 @@
   <p:clrMapOvr>
     <a:masterClrMapping/>
   </p:clrMapOvr>
-  <p:timing>
-    <p:tnLst>
-      <p:par>
-        <p:cTn id="1" dur="indefinite" restart="never" nodeType="tmRoot"/>
-      </p:par>
-    </p:tnLst>
-  </p:timing>
 </p:sld>
 </file>
 
@@ -4022,10 +3980,9 @@
           <a:lstStyle/>
           <a:p>
             <a:r>
-              <a:rPr lang="en-US" dirty="0" smtClean="0"/>
+              <a:rPr lang="en-US" dirty="0"/>
               <a:t>Contents</a:t>
             </a:r>
-            <a:endParaRPr lang="en-US" dirty="0"/>
           </a:p>
         </p:txBody>
       </p:sp>
@@ -4047,51 +4004,51 @@
           <a:lstStyle/>
           <a:p>
             <a:r>
-              <a:rPr lang="en-US" dirty="0" smtClean="0"/>
+              <a:rPr lang="en-US" dirty="0"/>
               <a:t>Introduction</a:t>
             </a:r>
           </a:p>
           <a:p>
             <a:r>
-              <a:rPr lang="en-US" dirty="0" smtClean="0"/>
+              <a:rPr lang="en-US" dirty="0"/>
               <a:t>What is Big Data</a:t>
             </a:r>
           </a:p>
           <a:p>
             <a:r>
-              <a:rPr lang="en-US" dirty="0" smtClean="0"/>
+              <a:rPr lang="en-US" dirty="0"/>
               <a:t>Dataset</a:t>
             </a:r>
           </a:p>
           <a:p>
             <a:r>
-              <a:rPr lang="en-US" dirty="0" smtClean="0"/>
+              <a:rPr lang="en-US" dirty="0"/>
               <a:t>Implementation of Dataset</a:t>
             </a:r>
           </a:p>
           <a:p>
             <a:r>
-              <a:rPr lang="en-US" dirty="0" smtClean="0"/>
+              <a:rPr lang="en-US" dirty="0"/>
               <a:t>Methodology</a:t>
             </a:r>
           </a:p>
           <a:p>
             <a:r>
-              <a:rPr lang="en-US" dirty="0" smtClean="0"/>
+              <a:rPr lang="en-US" dirty="0"/>
               <a:t>User Interface</a:t>
             </a:r>
           </a:p>
           <a:p>
             <a:r>
-              <a:rPr lang="en-US" dirty="0" smtClean="0"/>
+              <a:rPr lang="en-US" dirty="0"/>
               <a:t>Future Prospective</a:t>
             </a:r>
           </a:p>
           <a:p>
-            <a:endParaRPr lang="en-US" dirty="0" smtClean="0"/>
-          </a:p>
-          <a:p>
-            <a:endParaRPr lang="en-US" dirty="0" smtClean="0"/>
+            <a:endParaRPr lang="en-US" dirty="0"/>
+          </a:p>
+          <a:p>
+            <a:endParaRPr lang="en-US" dirty="0"/>
           </a:p>
           <a:p>
             <a:endParaRPr lang="en-US" dirty="0"/>
@@ -4103,13 +4060,6 @@
   <p:clrMapOvr>
     <a:masterClrMapping/>
   </p:clrMapOvr>
-  <p:timing>
-    <p:tnLst>
-      <p:par>
-        <p:cTn id="1" dur="indefinite" restart="never" nodeType="tmRoot"/>
-      </p:par>
-    </p:tnLst>
-  </p:timing>
 </p:sld>
 </file>
 
@@ -4146,10 +4096,9 @@
           <a:lstStyle/>
           <a:p>
             <a:r>
-              <a:rPr lang="en-US" dirty="0" smtClean="0"/>
+              <a:rPr lang="en-US" dirty="0"/>
               <a:t>Introduction</a:t>
             </a:r>
-            <a:endParaRPr lang="en-US" dirty="0"/>
           </a:p>
         </p:txBody>
       </p:sp>
@@ -4169,19 +4118,19 @@
           <a:lstStyle/>
           <a:p>
             <a:r>
-              <a:rPr lang="en-US" dirty="0" smtClean="0"/>
+              <a:rPr lang="en-US" dirty="0"/>
               <a:t>Farming is the backbone of the country.</a:t>
             </a:r>
           </a:p>
           <a:p>
             <a:r>
-              <a:rPr lang="en-US" dirty="0" smtClean="0"/>
+              <a:rPr lang="en-US" dirty="0"/>
               <a:t>Government is taking many initiatives for farming.</a:t>
             </a:r>
           </a:p>
           <a:p>
             <a:r>
-              <a:rPr lang="en-US" dirty="0" smtClean="0"/>
+              <a:rPr lang="en-US" dirty="0"/>
               <a:t>We will tell the farmers which crops are beneficial for them and in which season which crop should they grow.</a:t>
             </a:r>
           </a:p>
@@ -4195,13 +4144,6 @@
   <p:clrMapOvr>
     <a:masterClrMapping/>
   </p:clrMapOvr>
-  <p:timing>
-    <p:tnLst>
-      <p:par>
-        <p:cTn id="1" dur="indefinite" restart="never" nodeType="tmRoot"/>
-      </p:par>
-    </p:tnLst>
-  </p:timing>
 </p:sld>
 </file>
 
@@ -4242,7 +4184,7 @@
               <a:buChar char="Ø"/>
             </a:pPr>
             <a:r>
-              <a:rPr lang="en-US" sz="6600" b="1" dirty="0" smtClean="0">
+              <a:rPr lang="en-US" sz="6600" b="1" dirty="0">
                 <a:ln w="17780" cmpd="sng">
                   <a:solidFill>
                     <a:srgbClr val="FFFFFF"/>
@@ -4327,10 +4269,9 @@
               <a:buChar char="Ø"/>
             </a:pPr>
             <a:r>
-              <a:rPr lang="en-US" sz="2000" dirty="0" smtClean="0"/>
+              <a:rPr lang="en-US" sz="2000" dirty="0"/>
               <a:t>Big data is a field that treats ways to analyze, systematically extract information from, or otherwise deal with data sets that are too large or complex to be dealt with by traditional data-processing application software.</a:t>
             </a:r>
-            <a:endParaRPr lang="en-US" sz="2000" dirty="0"/>
           </a:p>
         </p:txBody>
       </p:sp>
@@ -4362,13 +4303,6 @@
   <p:clrMapOvr>
     <a:masterClrMapping/>
   </p:clrMapOvr>
-  <p:timing>
-    <p:tnLst>
-      <p:par>
-        <p:cTn id="1" dur="indefinite" restart="never" nodeType="tmRoot"/>
-      </p:par>
-    </p:tnLst>
-  </p:timing>
 </p:sld>
 </file>
 
@@ -4405,7 +4339,7 @@
           <a:lstStyle/>
           <a:p>
             <a:r>
-              <a:rPr lang="en-US" spc="-5" dirty="0" smtClean="0"/>
+              <a:rPr lang="en-US" spc="-5" dirty="0"/>
               <a:t>Dataset</a:t>
             </a:r>
             <a:endParaRPr lang="en-US" dirty="0"/>
@@ -4430,46 +4364,57 @@
           <a:lstStyle/>
           <a:p>
             <a:r>
-              <a:rPr lang="en-US" sz="2400" dirty="0" smtClean="0"/>
+              <a:rPr lang="en-US" sz="2400" dirty="0"/>
               <a:t>Main Data source :  </a:t>
             </a:r>
             <a:r>
-              <a:rPr lang="en-US" sz="2400" dirty="0" smtClean="0">
+              <a:rPr lang="en-US" sz="2400" dirty="0">
                 <a:hlinkClick r:id="rId2"/>
               </a:rPr>
               <a:t>https://data.gov.in/</a:t>
             </a:r>
-            <a:endParaRPr lang="en-US" sz="2400" dirty="0" smtClean="0"/>
-          </a:p>
-          <a:p>
-            <a:r>
-              <a:rPr lang="en-IN" sz="2400" dirty="0" smtClean="0"/>
-              <a:t>Main Columns are : State, District, Season, Crop, Area &amp; Production.</a:t>
-            </a:r>
-            <a:endParaRPr lang="en-US" sz="2400" dirty="0" smtClean="0"/>
-          </a:p>
-          <a:p>
-            <a:r>
-              <a:rPr lang="en-US" sz="2400" dirty="0" smtClean="0"/>
+            <a:endParaRPr lang="en-US" sz="2400" dirty="0"/>
+          </a:p>
+          <a:p>
+            <a:r>
+              <a:rPr lang="en-IN" sz="2400" dirty="0"/>
+              <a:t>Main Columns are : </a:t>
+            </a:r>
+            <a:r>
+              <a:rPr lang="en-IN" sz="2400" b="1" dirty="0">
+                <a:solidFill>
+                  <a:srgbClr val="0070C0"/>
+                </a:solidFill>
+              </a:rPr>
+              <a:t>State, District, Season, Crop, Area &amp; Production.</a:t>
+            </a:r>
+            <a:endParaRPr lang="en-US" sz="2400" b="1" dirty="0">
+              <a:solidFill>
+                <a:srgbClr val="0070C0"/>
+              </a:solidFill>
+            </a:endParaRPr>
+          </a:p>
+          <a:p>
+            <a:r>
+              <a:rPr lang="en-US" sz="2400" dirty="0"/>
               <a:t>We added a new column of production per area.</a:t>
             </a:r>
           </a:p>
           <a:p>
             <a:r>
-              <a:rPr lang="en-IN" sz="2400" dirty="0" smtClean="0"/>
+              <a:rPr lang="en-IN" sz="2400" dirty="0"/>
               <a:t>Imported the data into MongoDB from CSV file.</a:t>
             </a:r>
-            <a:endParaRPr lang="en-US" sz="2400" dirty="0" smtClean="0"/>
+            <a:endParaRPr lang="en-US" sz="2400" dirty="0"/>
           </a:p>
           <a:p>
             <a:pPr>
               <a:buNone/>
             </a:pPr>
             <a:r>
-              <a:rPr lang="en-US" sz="2400" dirty="0" smtClean="0"/>
+              <a:rPr lang="en-US" sz="2400" dirty="0"/>
               <a:t> </a:t>
             </a:r>
-            <a:endParaRPr lang="en-US" sz="2400" dirty="0"/>
           </a:p>
         </p:txBody>
       </p:sp>
@@ -4478,13 +4423,6 @@
   <p:clrMapOvr>
     <a:masterClrMapping/>
   </p:clrMapOvr>
-  <p:timing>
-    <p:tnLst>
-      <p:par>
-        <p:cTn id="1" dur="indefinite" restart="never" nodeType="tmRoot"/>
-      </p:par>
-    </p:tnLst>
-  </p:timing>
 </p:sld>
 </file>
 
@@ -4526,11 +4464,11 @@
           <a:lstStyle/>
           <a:p>
             <a:r>
-              <a:rPr lang="en-US" spc="-5" dirty="0" err="1" smtClean="0"/>
+              <a:rPr lang="en-US" spc="-5" dirty="0" err="1"/>
               <a:t>Implentation</a:t>
             </a:r>
             <a:r>
-              <a:rPr lang="en-US" spc="-5" dirty="0" smtClean="0"/>
+              <a:rPr lang="en-US" spc="-5" dirty="0"/>
               <a:t> of Dataset</a:t>
             </a:r>
             <a:endParaRPr lang="en-US" dirty="0"/>
@@ -4560,30 +4498,29 @@
           <a:lstStyle/>
           <a:p>
             <a:r>
-              <a:rPr lang="en-IN" sz="3000" dirty="0" smtClean="0"/>
+              <a:rPr lang="en-IN" sz="3000" dirty="0"/>
               <a:t>Used the command Mongo Import to import the dataset into MongoDB:- </a:t>
             </a:r>
           </a:p>
           <a:p>
             <a:pPr lvl="1"/>
             <a:r>
-              <a:rPr lang="en-IN" sz="2100" dirty="0" smtClean="0"/>
+              <a:rPr lang="en-IN" sz="2100" dirty="0"/>
               <a:t>mongoimport -d cropdata -c data --type csv --file finalcrops.csv --headerline</a:t>
             </a:r>
           </a:p>
           <a:p>
             <a:pPr lvl="1"/>
-            <a:endParaRPr lang="en-US" sz="2000" dirty="0" smtClean="0"/>
+            <a:endParaRPr lang="en-US" sz="2000" dirty="0"/>
           </a:p>
           <a:p>
             <a:pPr>
               <a:buNone/>
             </a:pPr>
             <a:r>
-              <a:rPr lang="en-US" sz="2400" dirty="0" smtClean="0"/>
+              <a:rPr lang="en-US" sz="2400" dirty="0"/>
               <a:t> </a:t>
             </a:r>
-            <a:endParaRPr lang="en-US" sz="2400" dirty="0"/>
           </a:p>
         </p:txBody>
       </p:sp>
@@ -4624,13 +4561,6 @@
   <p:clrMapOvr>
     <a:masterClrMapping/>
   </p:clrMapOvr>
-  <p:timing>
-    <p:tnLst>
-      <p:par>
-        <p:cTn id="1" dur="indefinite" restart="never" nodeType="tmRoot"/>
-      </p:par>
-    </p:tnLst>
-  </p:timing>
 </p:sld>
 </file>
 
@@ -4667,10 +4597,9 @@
           <a:lstStyle/>
           <a:p>
             <a:r>
-              <a:rPr lang="en-US" dirty="0" smtClean="0"/>
+              <a:rPr lang="en-US" dirty="0"/>
               <a:t>Methodology</a:t>
             </a:r>
-            <a:endParaRPr lang="en-US" dirty="0"/>
           </a:p>
         </p:txBody>
       </p:sp>
@@ -4697,58 +4626,58 @@
           <a:lstStyle/>
           <a:p>
             <a:r>
-              <a:rPr lang="en-US" sz="2400" dirty="0" smtClean="0"/>
+              <a:rPr lang="en-US" sz="2400" dirty="0"/>
               <a:t>We took the data from data.gov.in and cleaned it.</a:t>
             </a:r>
           </a:p>
           <a:p>
             <a:r>
-              <a:rPr lang="en-US" sz="2400" dirty="0" smtClean="0"/>
+              <a:rPr lang="en-US" sz="2400" dirty="0"/>
               <a:t>Transferred the data into </a:t>
             </a:r>
             <a:r>
-              <a:rPr lang="en-US" sz="2400" dirty="0" err="1" smtClean="0"/>
+              <a:rPr lang="en-US" sz="2400" dirty="0" err="1"/>
               <a:t>MongoDB</a:t>
             </a:r>
             <a:r>
-              <a:rPr lang="en-US" sz="2400" dirty="0" smtClean="0"/>
+              <a:rPr lang="en-US" sz="2400" dirty="0"/>
               <a:t>.</a:t>
             </a:r>
           </a:p>
           <a:p>
             <a:r>
-              <a:rPr lang="en-US" sz="2400" dirty="0" smtClean="0"/>
+              <a:rPr lang="en-US" sz="2400" dirty="0"/>
               <a:t>Connection of database with node.js used Express to create  local server.</a:t>
             </a:r>
           </a:p>
           <a:p>
             <a:r>
-              <a:rPr lang="en-US" sz="2400" dirty="0" smtClean="0"/>
+              <a:rPr lang="en-US" sz="2400" dirty="0"/>
               <a:t>Embedded queries of </a:t>
             </a:r>
             <a:r>
-              <a:rPr lang="en-US" sz="2400" dirty="0" err="1" smtClean="0"/>
+              <a:rPr lang="en-US" sz="2400" dirty="0" err="1"/>
               <a:t>mongoDB</a:t>
             </a:r>
             <a:r>
-              <a:rPr lang="en-US" sz="2400" dirty="0" smtClean="0"/>
+              <a:rPr lang="en-US" sz="2400" dirty="0"/>
               <a:t> into node.js.</a:t>
             </a:r>
           </a:p>
           <a:p>
             <a:r>
-              <a:rPr lang="en-US" sz="2400" dirty="0" smtClean="0"/>
+              <a:rPr lang="en-US" sz="2400" dirty="0"/>
               <a:t>Displaying results on the basis of queries of farmers.</a:t>
             </a:r>
           </a:p>
           <a:p>
-            <a:endParaRPr lang="en-US" sz="2400" dirty="0" smtClean="0"/>
-          </a:p>
-          <a:p>
-            <a:endParaRPr lang="en-US" sz="2400" dirty="0" smtClean="0"/>
-          </a:p>
-          <a:p>
-            <a:endParaRPr lang="en-US" sz="2400" dirty="0" smtClean="0"/>
+            <a:endParaRPr lang="en-US" sz="2400" dirty="0"/>
+          </a:p>
+          <a:p>
+            <a:endParaRPr lang="en-US" sz="2400" dirty="0"/>
+          </a:p>
+          <a:p>
+            <a:endParaRPr lang="en-US" sz="2400" dirty="0"/>
           </a:p>
           <a:p>
             <a:endParaRPr lang="en-US" sz="2400" dirty="0"/>
@@ -4760,13 +4689,6 @@
   <p:clrMapOvr>
     <a:masterClrMapping/>
   </p:clrMapOvr>
-  <p:timing>
-    <p:tnLst>
-      <p:par>
-        <p:cTn id="1" dur="indefinite" restart="never" nodeType="tmRoot"/>
-      </p:par>
-    </p:tnLst>
-  </p:timing>
 </p:sld>
 </file>
 
@@ -4803,10 +4725,9 @@
           <a:lstStyle/>
           <a:p>
             <a:r>
-              <a:rPr lang="en-US" dirty="0" smtClean="0"/>
+              <a:rPr lang="en-US" dirty="0"/>
               <a:t>User Interface</a:t>
             </a:r>
-            <a:endParaRPr lang="en-US" dirty="0"/>
           </a:p>
         </p:txBody>
       </p:sp>
@@ -4838,13 +4759,6 @@
   <p:clrMapOvr>
     <a:masterClrMapping/>
   </p:clrMapOvr>
-  <p:timing>
-    <p:tnLst>
-      <p:par>
-        <p:cTn id="1" dur="indefinite" restart="never" nodeType="tmRoot"/>
-      </p:par>
-    </p:tnLst>
-  </p:timing>
 </p:sld>
 </file>
 
@@ -4881,10 +4795,9 @@
           <a:lstStyle/>
           <a:p>
             <a:r>
-              <a:rPr lang="en-US" dirty="0" smtClean="0"/>
+              <a:rPr lang="en-US" dirty="0"/>
               <a:t> </a:t>
             </a:r>
-            <a:endParaRPr lang="en-US" dirty="0"/>
           </a:p>
         </p:txBody>
       </p:sp>
@@ -4927,13 +4840,6 @@
   <p:clrMapOvr>
     <a:masterClrMapping/>
   </p:clrMapOvr>
-  <p:timing>
-    <p:tnLst>
-      <p:par>
-        <p:cTn id="1" dur="indefinite" restart="never" nodeType="tmRoot"/>
-      </p:par>
-    </p:tnLst>
-  </p:timing>
 </p:sld>
 </file>
 

</xml_diff>